<commit_message>
Präsentation Notizen erstellt und angepasst
</commit_message>
<xml_diff>
--- a/Präsentation.pptx
+++ b/Präsentation.pptx
@@ -176,14 +176,6 @@
             <ac:spMk id="2" creationId="{635F6197-1361-5198-CCDB-27436A962361}"/>
           </ac:spMkLst>
         </pc:spChg>
-        <pc:spChg chg="del">
-          <ac:chgData name="Jamil Bassiri" userId="b196da6b-41a7-4ae7-b548-91dfad7c6a4d" providerId="ADAL" clId="{FCC8F431-5E80-4D2A-8BC0-CD9BD62E5F7D}" dt="2024-11-30T14:29:35.189" v="70"/>
-          <ac:spMkLst>
-            <pc:docMk/>
-            <pc:sldMk cId="2582629291" sldId="258"/>
-            <ac:spMk id="3" creationId="{ACA876EB-8580-9897-7337-A038C7BDBE5E}"/>
-          </ac:spMkLst>
-        </pc:spChg>
         <pc:picChg chg="add mod">
           <ac:chgData name="Jamil Bassiri" userId="b196da6b-41a7-4ae7-b548-91dfad7c6a4d" providerId="ADAL" clId="{FCC8F431-5E80-4D2A-8BC0-CD9BD62E5F7D}" dt="2024-11-30T14:30:47.977" v="83" actId="1076"/>
           <ac:picMkLst>
@@ -213,14 +205,6 @@
             <pc:docMk/>
             <pc:sldMk cId="13825366" sldId="259"/>
             <ac:spMk id="2" creationId="{82BC36E7-212A-96C6-B91A-731EB4ADDD8E}"/>
-          </ac:spMkLst>
-        </pc:spChg>
-        <pc:spChg chg="del">
-          <ac:chgData name="Jamil Bassiri" userId="b196da6b-41a7-4ae7-b548-91dfad7c6a4d" providerId="ADAL" clId="{FCC8F431-5E80-4D2A-8BC0-CD9BD62E5F7D}" dt="2024-11-30T14:25:22.167" v="41" actId="22"/>
-          <ac:spMkLst>
-            <pc:docMk/>
-            <pc:sldMk cId="13825366" sldId="259"/>
-            <ac:spMk id="3" creationId="{49D2A824-CCF9-45D0-B990-B24B280EBA5B}"/>
           </ac:spMkLst>
         </pc:spChg>
         <pc:picChg chg="add mod ord">
@@ -268,30 +252,6 @@
             <ac:spMk id="2" creationId="{31FA10AE-C292-B865-80F7-DD74CD090134}"/>
           </ac:spMkLst>
         </pc:spChg>
-        <pc:spChg chg="del">
-          <ac:chgData name="Jamil Bassiri" userId="b196da6b-41a7-4ae7-b548-91dfad7c6a4d" providerId="ADAL" clId="{FCC8F431-5E80-4D2A-8BC0-CD9BD62E5F7D}" dt="2024-11-30T14:32:55.846" v="115"/>
-          <ac:spMkLst>
-            <pc:docMk/>
-            <pc:sldMk cId="3250089711" sldId="260"/>
-            <ac:spMk id="3" creationId="{BFD0B8E5-658C-FD85-23AC-4ED0F3F5E061}"/>
-          </ac:spMkLst>
-        </pc:spChg>
-        <pc:spChg chg="add del mod">
-          <ac:chgData name="Jamil Bassiri" userId="b196da6b-41a7-4ae7-b548-91dfad7c6a4d" providerId="ADAL" clId="{FCC8F431-5E80-4D2A-8BC0-CD9BD62E5F7D}" dt="2024-11-30T14:45:34.372" v="265" actId="478"/>
-          <ac:spMkLst>
-            <pc:docMk/>
-            <pc:sldMk cId="3250089711" sldId="260"/>
-            <ac:spMk id="9" creationId="{3A3D3CD2-B155-891C-1E31-DB3638FA17D6}"/>
-          </ac:spMkLst>
-        </pc:spChg>
-        <pc:picChg chg="add del mod">
-          <ac:chgData name="Jamil Bassiri" userId="b196da6b-41a7-4ae7-b548-91dfad7c6a4d" providerId="ADAL" clId="{FCC8F431-5E80-4D2A-8BC0-CD9BD62E5F7D}" dt="2024-11-30T14:45:07.724" v="252" actId="21"/>
-          <ac:picMkLst>
-            <pc:docMk/>
-            <pc:sldMk cId="3250089711" sldId="260"/>
-            <ac:picMk id="5" creationId="{F2F5D86C-920A-8C46-D3CF-F69E5D9210FF}"/>
-          </ac:picMkLst>
-        </pc:picChg>
         <pc:picChg chg="add mod">
           <ac:chgData name="Jamil Bassiri" userId="b196da6b-41a7-4ae7-b548-91dfad7c6a4d" providerId="ADAL" clId="{FCC8F431-5E80-4D2A-8BC0-CD9BD62E5F7D}" dt="2024-11-30T14:45:40.974" v="268" actId="1076"/>
           <ac:picMkLst>
@@ -313,14 +273,6 @@
             <pc:docMk/>
             <pc:sldMk cId="4228306589" sldId="261"/>
             <ac:spMk id="2" creationId="{78A3012B-FFA8-7A53-DFFA-2AC7D4C879B5}"/>
-          </ac:spMkLst>
-        </pc:spChg>
-        <pc:spChg chg="del">
-          <ac:chgData name="Jamil Bassiri" userId="b196da6b-41a7-4ae7-b548-91dfad7c6a4d" providerId="ADAL" clId="{FCC8F431-5E80-4D2A-8BC0-CD9BD62E5F7D}" dt="2024-11-30T14:34:45.583" v="130"/>
-          <ac:spMkLst>
-            <pc:docMk/>
-            <pc:sldMk cId="4228306589" sldId="261"/>
-            <ac:spMk id="3" creationId="{1206D4E1-0DF0-4FEA-D212-21F9A651152D}"/>
           </ac:spMkLst>
         </pc:spChg>
         <pc:picChg chg="add mod modCrop">
@@ -385,14 +337,6 @@
             <ac:spMk id="2" creationId="{2A0E0564-E04E-8F25-E48C-F05BA78C10E5}"/>
           </ac:spMkLst>
         </pc:spChg>
-        <pc:spChg chg="del">
-          <ac:chgData name="Jamil Bassiri" userId="b196da6b-41a7-4ae7-b548-91dfad7c6a4d" providerId="ADAL" clId="{FCC8F431-5E80-4D2A-8BC0-CD9BD62E5F7D}" dt="2024-11-30T14:45:09.820" v="253"/>
-          <ac:spMkLst>
-            <pc:docMk/>
-            <pc:sldMk cId="1223273637" sldId="263"/>
-            <ac:spMk id="3" creationId="{F9CF0DCB-DFAF-8587-731F-5DB27628822E}"/>
-          </ac:spMkLst>
-        </pc:spChg>
         <pc:picChg chg="add mod">
           <ac:chgData name="Jamil Bassiri" userId="b196da6b-41a7-4ae7-b548-91dfad7c6a4d" providerId="ADAL" clId="{FCC8F431-5E80-4D2A-8BC0-CD9BD62E5F7D}" dt="2024-11-30T14:45:44.739" v="269" actId="1076"/>
           <ac:picMkLst>
@@ -416,14 +360,6 @@
             <ac:spMk id="2" creationId="{84F43C3B-635A-190B-DB28-B2AE6EF32429}"/>
           </ac:spMkLst>
         </pc:spChg>
-        <pc:spChg chg="del">
-          <ac:chgData name="Jamil Bassiri" userId="b196da6b-41a7-4ae7-b548-91dfad7c6a4d" providerId="ADAL" clId="{FCC8F431-5E80-4D2A-8BC0-CD9BD62E5F7D}" dt="2024-11-30T14:47:22.460" v="282"/>
-          <ac:spMkLst>
-            <pc:docMk/>
-            <pc:sldMk cId="2500472616" sldId="264"/>
-            <ac:spMk id="3" creationId="{E6FE8A91-12B8-B2AB-8260-392AC1AC32AE}"/>
-          </ac:spMkLst>
-        </pc:spChg>
         <pc:picChg chg="add mod">
           <ac:chgData name="Jamil Bassiri" userId="b196da6b-41a7-4ae7-b548-91dfad7c6a4d" providerId="ADAL" clId="{FCC8F431-5E80-4D2A-8BC0-CD9BD62E5F7D}" dt="2024-11-30T14:47:33.846" v="286" actId="1076"/>
           <ac:picMkLst>
@@ -439,36 +375,12 @@
           <pc:docMk/>
           <pc:sldMk cId="818704942" sldId="265"/>
         </pc:sldMkLst>
-        <pc:spChg chg="del mod ord">
-          <ac:chgData name="Jamil Bassiri" userId="b196da6b-41a7-4ae7-b548-91dfad7c6a4d" providerId="ADAL" clId="{FCC8F431-5E80-4D2A-8BC0-CD9BD62E5F7D}" dt="2024-11-30T14:59:59.199" v="376" actId="700"/>
-          <ac:spMkLst>
-            <pc:docMk/>
-            <pc:sldMk cId="818704942" sldId="265"/>
-            <ac:spMk id="2" creationId="{679E73C0-27F3-B252-5FFB-0A76B9273DC0}"/>
-          </ac:spMkLst>
-        </pc:spChg>
-        <pc:spChg chg="del mod ord">
-          <ac:chgData name="Jamil Bassiri" userId="b196da6b-41a7-4ae7-b548-91dfad7c6a4d" providerId="ADAL" clId="{FCC8F431-5E80-4D2A-8BC0-CD9BD62E5F7D}" dt="2024-11-30T14:59:59.199" v="376" actId="700"/>
-          <ac:spMkLst>
-            <pc:docMk/>
-            <pc:sldMk cId="818704942" sldId="265"/>
-            <ac:spMk id="3" creationId="{BC3AAAF8-7CAA-B6B7-FDEB-259BAF23C8A8}"/>
-          </ac:spMkLst>
-        </pc:spChg>
         <pc:spChg chg="add mod ord">
           <ac:chgData name="Jamil Bassiri" userId="b196da6b-41a7-4ae7-b548-91dfad7c6a4d" providerId="ADAL" clId="{FCC8F431-5E80-4D2A-8BC0-CD9BD62E5F7D}" dt="2024-11-30T15:00:18.479" v="387" actId="20577"/>
           <ac:spMkLst>
             <pc:docMk/>
             <pc:sldMk cId="818704942" sldId="265"/>
             <ac:spMk id="6" creationId="{4F625E81-F70B-AF5E-0BF0-F47D770183AD}"/>
-          </ac:spMkLst>
-        </pc:spChg>
-        <pc:spChg chg="add del mod ord">
-          <ac:chgData name="Jamil Bassiri" userId="b196da6b-41a7-4ae7-b548-91dfad7c6a4d" providerId="ADAL" clId="{FCC8F431-5E80-4D2A-8BC0-CD9BD62E5F7D}" dt="2024-11-30T15:00:13.566" v="380" actId="478"/>
-          <ac:spMkLst>
-            <pc:docMk/>
-            <pc:sldMk cId="818704942" sldId="265"/>
-            <ac:spMk id="7" creationId="{BA30ACD1-E366-F4A3-E117-9C979476A2E3}"/>
           </ac:spMkLst>
         </pc:spChg>
         <pc:picChg chg="add mod">
@@ -514,57 +426,30 @@
       </pc:docMkLst>
     </pc:docChg>
   </pc:docChgLst>
+  <pc:docChgLst>
+    <pc:chgData name="Jamil Bassiri" userId="b196da6b-41a7-4ae7-b548-91dfad7c6a4d" providerId="ADAL" clId="{458BA4CF-7EEE-4661-889F-D0A56760215B}"/>
+    <pc:docChg chg="modSld">
+      <pc:chgData name="Jamil Bassiri" userId="b196da6b-41a7-4ae7-b548-91dfad7c6a4d" providerId="ADAL" clId="{458BA4CF-7EEE-4661-889F-D0A56760215B}" dt="2024-12-07T09:24:44.504" v="9" actId="20577"/>
+      <pc:docMkLst>
+        <pc:docMk/>
+      </pc:docMkLst>
+      <pc:sldChg chg="modNotesTx">
+        <pc:chgData name="Jamil Bassiri" userId="b196da6b-41a7-4ae7-b548-91dfad7c6a4d" providerId="ADAL" clId="{458BA4CF-7EEE-4661-889F-D0A56760215B}" dt="2024-12-07T09:24:44.504" v="9" actId="20577"/>
+        <pc:sldMkLst>
+          <pc:docMk/>
+          <pc:sldMk cId="2582629291" sldId="258"/>
+        </pc:sldMkLst>
+      </pc:sldChg>
+      <pc:sldChg chg="modNotesTx">
+        <pc:chgData name="Jamil Bassiri" userId="b196da6b-41a7-4ae7-b548-91dfad7c6a4d" providerId="ADAL" clId="{458BA4CF-7EEE-4661-889F-D0A56760215B}" dt="2024-12-07T09:24:22.740" v="4"/>
+        <pc:sldMkLst>
+          <pc:docMk/>
+          <pc:sldMk cId="3250089711" sldId="260"/>
+        </pc:sldMkLst>
+      </pc:sldChg>
+    </pc:docChg>
+  </pc:docChgLst>
 </pc:chgInfo>
-</file>
-
-<file path=ppt/comments/modernComment_102_99EFCBAB.xml><?xml version="1.0" encoding="utf-8"?>
-<p188:cmLst xmlns:a="http://schemas.openxmlformats.org/drawingml/2006/main" xmlns:r="http://schemas.openxmlformats.org/officeDocument/2006/relationships" xmlns:p188="http://schemas.microsoft.com/office/powerpoint/2018/8/main">
-  <p188:cm id="{0BD83AD1-61DB-4D05-AC06-46CC59DEF17D}" authorId="{4760B6F1-780F-8076-890F-0985A633D3BB}" created="2024-12-04T20:14:03.269">
-    <pc:sldMkLst xmlns:pc="http://schemas.microsoft.com/office/powerpoint/2013/main/command">
-      <pc:docMk/>
-      <pc:sldMk cId="2582629291" sldId="258"/>
-    </pc:sldMkLst>
-    <p188:txBody>
-      <a:bodyPr/>
-      <a:lstStyle/>
-      <a:p>
-        <a:r>
-          <a:rPr lang="de-DE"/>
-          <a:t>Ausgabe Variable = Sortierte Zahlen/ ...2
-Funktionsaufruf durch sort/ insertionsort
-Mitgegebener wert in Klammer
-def sort DEFiniert die funktion sort
-return ist der Rückgabewert
-sorted ist die Standardfunktion fürs sortieren in Python</a:t>
-        </a:r>
-      </a:p>
-    </p188:txBody>
-  </p188:cm>
-</p188:cmLst>
-</file>
-
-<file path=ppt/comments/modernComment_104_C1B86EEF.xml><?xml version="1.0" encoding="utf-8"?>
-<p188:cmLst xmlns:a="http://schemas.openxmlformats.org/drawingml/2006/main" xmlns:r="http://schemas.openxmlformats.org/officeDocument/2006/relationships" xmlns:p188="http://schemas.microsoft.com/office/powerpoint/2018/8/main">
-  <p188:cm id="{8716D74C-A77B-4169-9CE4-DC93B80194E9}" authorId="{4760B6F1-780F-8076-890F-0985A633D3BB}" created="2024-12-04T20:16:28.100">
-    <pc:sldMkLst xmlns:pc="http://schemas.microsoft.com/office/powerpoint/2013/main/command">
-      <pc:docMk/>
-      <pc:sldMk cId="3250089711" sldId="260"/>
-    </pc:sldMkLst>
-    <p188:txBody>
-      <a:bodyPr/>
-      <a:lstStyle/>
-      <a:p>
-        <a:r>
-          <a:rPr lang="de-DE"/>
-          <a:t>print für schreiben in Konsole
-input() erlaubt die Eingabe durch den User
-[] definiert ein Array, welches aus der User Eingabe s pro Zahl ein Element erzeugt
-#zahlen für schnelleres Testen ohne User Input. bei Verwendung sollte Userinput auskommentiert werden</a:t>
-        </a:r>
-      </a:p>
-    </p188:txBody>
-  </p188:cm>
-</p188:cmLst>
 </file>
 
 <file path=ppt/notesMasters/notesMaster1.xml><?xml version="1.0" encoding="utf-8"?>
@@ -649,7 +534,7 @@
           <a:p>
             <a:fld id="{CE78110C-8A82-4CD0-B456-A18D373BA7AC}" type="datetimeFigureOut">
               <a:rPr lang="de-CH" smtClean="0"/>
-              <a:t>06.12.2024</a:t>
+              <a:t>07.12.2024</a:t>
             </a:fld>
             <a:endParaRPr lang="de-CH"/>
           </a:p>
@@ -1316,9 +1201,217 @@
           <a:lstStyle/>
           <a:p>
             <a:r>
-              <a:rPr lang="de-CH" dirty="0"/>
-              <a:t>Daniel:</a:t>
-            </a:r>
+              <a:rPr lang="de-CH"/>
+              <a:t>Jamil:</a:t>
+            </a:r>
+            <a:endParaRPr lang="de-CH" dirty="0"/>
+          </a:p>
+          <a:p>
+            <a:pPr marL="0" marR="0" lvl="0" indent="0" algn="l" defTabSz="914400" rtl="0" eaLnBrk="1" fontAlgn="auto" latinLnBrk="0" hangingPunct="1">
+              <a:lnSpc>
+                <a:spcPct val="100000"/>
+              </a:lnSpc>
+              <a:spcBef>
+                <a:spcPts val="0"/>
+              </a:spcBef>
+              <a:spcAft>
+                <a:spcPts val="0"/>
+              </a:spcAft>
+              <a:buClrTx/>
+              <a:buSzTx/>
+              <a:buFontTx/>
+              <a:buNone/>
+              <a:tabLst/>
+              <a:defRPr/>
+            </a:pPr>
+            <a:r>
+              <a:rPr lang="de-DE" sz="1800" dirty="0">
+                <a:effectLst/>
+                <a:latin typeface="Segoe UI" panose="020B0502040204020203" pitchFamily="34" charset="0"/>
+              </a:rPr>
+              <a:t>Ausgabe Variable = Sortierte Zahlen/ ...2</a:t>
+            </a:r>
+            <a:br>
+              <a:rPr lang="de-DE" sz="1800" dirty="0">
+                <a:effectLst/>
+                <a:latin typeface="Segoe UI" panose="020B0502040204020203" pitchFamily="34" charset="0"/>
+              </a:rPr>
+            </a:br>
+            <a:br>
+              <a:rPr lang="de-DE" sz="1800" dirty="0">
+                <a:effectLst/>
+                <a:latin typeface="Segoe UI" panose="020B0502040204020203" pitchFamily="34" charset="0"/>
+              </a:rPr>
+            </a:br>
+            <a:r>
+              <a:rPr lang="de-DE" sz="1800" dirty="0">
+                <a:effectLst/>
+                <a:latin typeface="Segoe UI" panose="020B0502040204020203" pitchFamily="34" charset="0"/>
+              </a:rPr>
+              <a:t>Funktionsaufruf durch </a:t>
+            </a:r>
+            <a:r>
+              <a:rPr lang="de-DE" sz="1800" dirty="0" err="1">
+                <a:effectLst/>
+                <a:latin typeface="Segoe UI" panose="020B0502040204020203" pitchFamily="34" charset="0"/>
+              </a:rPr>
+              <a:t>sort</a:t>
+            </a:r>
+            <a:r>
+              <a:rPr lang="de-DE" sz="1800" dirty="0">
+                <a:effectLst/>
+                <a:latin typeface="Segoe UI" panose="020B0502040204020203" pitchFamily="34" charset="0"/>
+              </a:rPr>
+              <a:t>/ </a:t>
+            </a:r>
+            <a:r>
+              <a:rPr lang="de-DE" sz="1800" dirty="0" err="1">
+                <a:effectLst/>
+                <a:latin typeface="Segoe UI" panose="020B0502040204020203" pitchFamily="34" charset="0"/>
+              </a:rPr>
+              <a:t>insertionsort</a:t>
+            </a:r>
+            <a:br>
+              <a:rPr lang="de-DE" sz="1800" dirty="0">
+                <a:effectLst/>
+                <a:latin typeface="Segoe UI" panose="020B0502040204020203" pitchFamily="34" charset="0"/>
+              </a:rPr>
+            </a:br>
+            <a:r>
+              <a:rPr lang="de-DE" sz="1800" dirty="0">
+                <a:effectLst/>
+                <a:latin typeface="Segoe UI" panose="020B0502040204020203" pitchFamily="34" charset="0"/>
+              </a:rPr>
+              <a:t>Mitgegebener wert in Klammer</a:t>
+            </a:r>
+            <a:br>
+              <a:rPr lang="de-DE" sz="1800" dirty="0">
+                <a:effectLst/>
+                <a:latin typeface="Segoe UI" panose="020B0502040204020203" pitchFamily="34" charset="0"/>
+              </a:rPr>
+            </a:br>
+            <a:br>
+              <a:rPr lang="de-DE" sz="1800" dirty="0">
+                <a:effectLst/>
+                <a:latin typeface="Segoe UI" panose="020B0502040204020203" pitchFamily="34" charset="0"/>
+              </a:rPr>
+            </a:br>
+            <a:r>
+              <a:rPr lang="de-DE" sz="1800" dirty="0" err="1">
+                <a:effectLst/>
+                <a:latin typeface="Segoe UI" panose="020B0502040204020203" pitchFamily="34" charset="0"/>
+              </a:rPr>
+              <a:t>def</a:t>
+            </a:r>
+            <a:r>
+              <a:rPr lang="de-DE" sz="1800" dirty="0">
+                <a:effectLst/>
+                <a:latin typeface="Segoe UI" panose="020B0502040204020203" pitchFamily="34" charset="0"/>
+              </a:rPr>
+              <a:t> </a:t>
+            </a:r>
+            <a:r>
+              <a:rPr lang="de-DE" sz="1800" dirty="0" err="1">
+                <a:effectLst/>
+                <a:latin typeface="Segoe UI" panose="020B0502040204020203" pitchFamily="34" charset="0"/>
+              </a:rPr>
+              <a:t>sort</a:t>
+            </a:r>
+            <a:r>
+              <a:rPr lang="de-DE" sz="1800" dirty="0">
+                <a:effectLst/>
+                <a:latin typeface="Segoe UI" panose="020B0502040204020203" pitchFamily="34" charset="0"/>
+              </a:rPr>
+              <a:t> </a:t>
+            </a:r>
+            <a:r>
+              <a:rPr lang="de-DE" sz="1800" dirty="0" err="1">
+                <a:effectLst/>
+                <a:latin typeface="Segoe UI" panose="020B0502040204020203" pitchFamily="34" charset="0"/>
+              </a:rPr>
+              <a:t>DEFiniert</a:t>
+            </a:r>
+            <a:r>
+              <a:rPr lang="de-DE" sz="1800" dirty="0">
+                <a:effectLst/>
+                <a:latin typeface="Segoe UI" panose="020B0502040204020203" pitchFamily="34" charset="0"/>
+              </a:rPr>
+              <a:t> die </a:t>
+            </a:r>
+            <a:r>
+              <a:rPr lang="de-DE" sz="1800" dirty="0" err="1">
+                <a:effectLst/>
+                <a:latin typeface="Segoe UI" panose="020B0502040204020203" pitchFamily="34" charset="0"/>
+              </a:rPr>
+              <a:t>funktion</a:t>
+            </a:r>
+            <a:r>
+              <a:rPr lang="de-DE" sz="1800" dirty="0">
+                <a:effectLst/>
+                <a:latin typeface="Segoe UI" panose="020B0502040204020203" pitchFamily="34" charset="0"/>
+              </a:rPr>
+              <a:t> </a:t>
+            </a:r>
+            <a:r>
+              <a:rPr lang="de-DE" sz="1800" dirty="0" err="1">
+                <a:effectLst/>
+                <a:latin typeface="Segoe UI" panose="020B0502040204020203" pitchFamily="34" charset="0"/>
+              </a:rPr>
+              <a:t>sort</a:t>
+            </a:r>
+            <a:br>
+              <a:rPr lang="de-DE" sz="1800" dirty="0">
+                <a:effectLst/>
+                <a:latin typeface="Segoe UI" panose="020B0502040204020203" pitchFamily="34" charset="0"/>
+              </a:rPr>
+            </a:br>
+            <a:r>
+              <a:rPr lang="de-DE" sz="1800" dirty="0" err="1">
+                <a:effectLst/>
+                <a:latin typeface="Segoe UI" panose="020B0502040204020203" pitchFamily="34" charset="0"/>
+              </a:rPr>
+              <a:t>return</a:t>
+            </a:r>
+            <a:r>
+              <a:rPr lang="de-DE" sz="1800" dirty="0">
+                <a:effectLst/>
+                <a:latin typeface="Segoe UI" panose="020B0502040204020203" pitchFamily="34" charset="0"/>
+              </a:rPr>
+              <a:t> ist der Rückgabewert</a:t>
+            </a:r>
+            <a:br>
+              <a:rPr lang="de-DE" sz="1800" dirty="0">
+                <a:effectLst/>
+                <a:latin typeface="Segoe UI" panose="020B0502040204020203" pitchFamily="34" charset="0"/>
+              </a:rPr>
+            </a:br>
+            <a:br>
+              <a:rPr lang="de-DE" sz="1800" dirty="0">
+                <a:effectLst/>
+                <a:latin typeface="Segoe UI" panose="020B0502040204020203" pitchFamily="34" charset="0"/>
+              </a:rPr>
+            </a:br>
+            <a:r>
+              <a:rPr lang="de-DE" sz="1800" dirty="0" err="1">
+                <a:effectLst/>
+                <a:latin typeface="Segoe UI" panose="020B0502040204020203" pitchFamily="34" charset="0"/>
+              </a:rPr>
+              <a:t>sorted</a:t>
+            </a:r>
+            <a:r>
+              <a:rPr lang="de-DE" sz="1800" dirty="0">
+                <a:effectLst/>
+                <a:latin typeface="Segoe UI" panose="020B0502040204020203" pitchFamily="34" charset="0"/>
+              </a:rPr>
+              <a:t> ist die Standardfunktion fürs sortieren in Python</a:t>
+            </a:r>
+            <a:endParaRPr lang="de-DE" sz="1800" dirty="0">
+              <a:effectLst/>
+              <a:latin typeface="Arial" panose="020B0604020202020204" pitchFamily="34" charset="0"/>
+            </a:endParaRPr>
+          </a:p>
+          <a:p>
+            <a:endParaRPr lang="de-CH" dirty="0"/>
           </a:p>
         </p:txBody>
       </p:sp>
@@ -1493,6 +1586,113 @@
               <a:rPr lang="de-CH" dirty="0"/>
               <a:t>Manuel</a:t>
             </a:r>
+          </a:p>
+          <a:p>
+            <a:endParaRPr lang="de-CH" dirty="0"/>
+          </a:p>
+          <a:p>
+            <a:pPr marL="0" marR="0" lvl="0" indent="0" algn="l" defTabSz="914400" rtl="0" eaLnBrk="1" fontAlgn="auto" latinLnBrk="0" hangingPunct="1">
+              <a:lnSpc>
+                <a:spcPct val="100000"/>
+              </a:lnSpc>
+              <a:spcBef>
+                <a:spcPts val="0"/>
+              </a:spcBef>
+              <a:spcAft>
+                <a:spcPts val="0"/>
+              </a:spcAft>
+              <a:buClrTx/>
+              <a:buSzTx/>
+              <a:buFontTx/>
+              <a:buNone/>
+              <a:tabLst/>
+              <a:defRPr/>
+            </a:pPr>
+            <a:r>
+              <a:rPr lang="de-DE" sz="1800" dirty="0" err="1">
+                <a:effectLst/>
+                <a:latin typeface="Segoe UI" panose="020B0502040204020203" pitchFamily="34" charset="0"/>
+              </a:rPr>
+              <a:t>print</a:t>
+            </a:r>
+            <a:r>
+              <a:rPr lang="de-DE" sz="1800" dirty="0">
+                <a:effectLst/>
+                <a:latin typeface="Segoe UI" panose="020B0502040204020203" pitchFamily="34" charset="0"/>
+              </a:rPr>
+              <a:t> für schreiben in Konsole</a:t>
+            </a:r>
+            <a:br>
+              <a:rPr lang="de-DE" sz="1800" dirty="0">
+                <a:effectLst/>
+                <a:latin typeface="Segoe UI" panose="020B0502040204020203" pitchFamily="34" charset="0"/>
+              </a:rPr>
+            </a:br>
+            <a:br>
+              <a:rPr lang="de-DE" sz="1800" dirty="0">
+                <a:effectLst/>
+                <a:latin typeface="Segoe UI" panose="020B0502040204020203" pitchFamily="34" charset="0"/>
+              </a:rPr>
+            </a:br>
+            <a:r>
+              <a:rPr lang="de-DE" sz="1800" dirty="0" err="1">
+                <a:effectLst/>
+                <a:latin typeface="Segoe UI" panose="020B0502040204020203" pitchFamily="34" charset="0"/>
+              </a:rPr>
+              <a:t>input</a:t>
+            </a:r>
+            <a:r>
+              <a:rPr lang="de-DE" sz="1800" dirty="0">
+                <a:effectLst/>
+                <a:latin typeface="Segoe UI" panose="020B0502040204020203" pitchFamily="34" charset="0"/>
+              </a:rPr>
+              <a:t>() erlaubt die Eingabe durch den User</a:t>
+            </a:r>
+            <a:br>
+              <a:rPr lang="de-DE" sz="1800" dirty="0">
+                <a:effectLst/>
+                <a:latin typeface="Segoe UI" panose="020B0502040204020203" pitchFamily="34" charset="0"/>
+              </a:rPr>
+            </a:br>
+            <a:br>
+              <a:rPr lang="de-DE" sz="1800" dirty="0">
+                <a:effectLst/>
+                <a:latin typeface="Segoe UI" panose="020B0502040204020203" pitchFamily="34" charset="0"/>
+              </a:rPr>
+            </a:br>
+            <a:r>
+              <a:rPr lang="de-DE" sz="1800" dirty="0">
+                <a:effectLst/>
+                <a:latin typeface="Segoe UI" panose="020B0502040204020203" pitchFamily="34" charset="0"/>
+              </a:rPr>
+              <a:t>[] definiert ein Array, welches aus der User Eingabe s pro Zahl ein Element erzeugt</a:t>
+            </a:r>
+            <a:br>
+              <a:rPr lang="de-DE" sz="1800" dirty="0">
+                <a:effectLst/>
+                <a:latin typeface="Segoe UI" panose="020B0502040204020203" pitchFamily="34" charset="0"/>
+              </a:rPr>
+            </a:br>
+            <a:br>
+              <a:rPr lang="de-DE" sz="1800" dirty="0">
+                <a:effectLst/>
+                <a:latin typeface="Segoe UI" panose="020B0502040204020203" pitchFamily="34" charset="0"/>
+              </a:rPr>
+            </a:br>
+            <a:r>
+              <a:rPr lang="de-DE" sz="1800" dirty="0">
+                <a:effectLst/>
+                <a:latin typeface="Segoe UI" panose="020B0502040204020203" pitchFamily="34" charset="0"/>
+              </a:rPr>
+              <a:t>#zahlen für schnelleres Testen ohne User Input. bei Verwendung sollte Userinput auskommentiert werden</a:t>
+            </a:r>
+            <a:endParaRPr lang="de-DE" sz="1800" dirty="0">
+              <a:effectLst/>
+              <a:latin typeface="Arial" panose="020B0604020202020204" pitchFamily="34" charset="0"/>
+            </a:endParaRPr>
+          </a:p>
+          <a:p>
+            <a:endParaRPr lang="de-CH" dirty="0"/>
           </a:p>
         </p:txBody>
       </p:sp>
@@ -2134,7 +2334,7 @@
           <a:p>
             <a:fld id="{48A87A34-81AB-432B-8DAE-1953F412C126}" type="datetimeFigureOut">
               <a:rPr lang="en-US" dirty="0"/>
-              <a:t>12/6/2024</a:t>
+              <a:t>12/7/2024</a:t>
             </a:fld>
             <a:endParaRPr lang="en-US" dirty="0"/>
           </a:p>
@@ -2396,7 +2596,7 @@
           <a:p>
             <a:fld id="{48A87A34-81AB-432B-8DAE-1953F412C126}" type="datetimeFigureOut">
               <a:rPr lang="en-US" dirty="0"/>
-              <a:t>12/6/2024</a:t>
+              <a:t>12/7/2024</a:t>
             </a:fld>
             <a:endParaRPr lang="en-US" dirty="0"/>
           </a:p>
@@ -2623,7 +2823,7 @@
             <a:fld id="{48A87A34-81AB-432B-8DAE-1953F412C126}" type="datetimeFigureOut">
               <a:rPr lang="en-US" dirty="0"/>
               <a:pPr/>
-              <a:t>12/6/2024</a:t>
+              <a:t>12/7/2024</a:t>
             </a:fld>
             <a:endParaRPr lang="en-US" dirty="0"/>
           </a:p>
@@ -2929,7 +3129,7 @@
             <a:fld id="{48A87A34-81AB-432B-8DAE-1953F412C126}" type="datetimeFigureOut">
               <a:rPr lang="en-US" dirty="0"/>
               <a:pPr/>
-              <a:t>12/6/2024</a:t>
+              <a:t>12/7/2024</a:t>
             </a:fld>
             <a:endParaRPr lang="en-US" dirty="0"/>
           </a:p>
@@ -3398,7 +3598,7 @@
             <a:fld id="{48A87A34-81AB-432B-8DAE-1953F412C126}" type="datetimeFigureOut">
               <a:rPr lang="en-US" dirty="0"/>
               <a:pPr/>
-              <a:t>12/6/2024</a:t>
+              <a:t>12/7/2024</a:t>
             </a:fld>
             <a:endParaRPr lang="en-US" dirty="0"/>
           </a:p>
@@ -3940,7 +4140,7 @@
           <a:p>
             <a:fld id="{48A87A34-81AB-432B-8DAE-1953F412C126}" type="datetimeFigureOut">
               <a:rPr lang="en-US" dirty="0"/>
-              <a:t>12/6/2024</a:t>
+              <a:t>12/7/2024</a:t>
             </a:fld>
             <a:endParaRPr lang="en-US" dirty="0"/>
           </a:p>
@@ -4709,7 +4909,7 @@
           <a:p>
             <a:fld id="{48A87A34-81AB-432B-8DAE-1953F412C126}" type="datetimeFigureOut">
               <a:rPr lang="en-US" dirty="0"/>
-              <a:t>12/6/2024</a:t>
+              <a:t>12/7/2024</a:t>
             </a:fld>
             <a:endParaRPr lang="en-US" dirty="0"/>
           </a:p>
@@ -4879,7 +5079,7 @@
           <a:p>
             <a:fld id="{48A87A34-81AB-432B-8DAE-1953F412C126}" type="datetimeFigureOut">
               <a:rPr lang="en-US" dirty="0"/>
-              <a:t>12/6/2024</a:t>
+              <a:t>12/7/2024</a:t>
             </a:fld>
             <a:endParaRPr lang="en-US" dirty="0"/>
           </a:p>
@@ -5098,7 +5298,7 @@
             <a:fld id="{48A87A34-81AB-432B-8DAE-1953F412C126}" type="datetimeFigureOut">
               <a:rPr lang="en-US" dirty="0"/>
               <a:pPr/>
-              <a:t>12/6/2024</a:t>
+              <a:t>12/7/2024</a:t>
             </a:fld>
             <a:endParaRPr lang="en-US" dirty="0"/>
           </a:p>
@@ -5273,7 +5473,7 @@
           <a:p>
             <a:fld id="{48A87A34-81AB-432B-8DAE-1953F412C126}" type="datetimeFigureOut">
               <a:rPr lang="en-US" dirty="0"/>
-              <a:t>12/6/2024</a:t>
+              <a:t>12/7/2024</a:t>
             </a:fld>
             <a:endParaRPr lang="en-US" dirty="0"/>
           </a:p>
@@ -5558,7 +5758,7 @@
             <a:fld id="{48A87A34-81AB-432B-8DAE-1953F412C126}" type="datetimeFigureOut">
               <a:rPr lang="en-US" dirty="0"/>
               <a:pPr/>
-              <a:t>12/6/2024</a:t>
+              <a:t>12/7/2024</a:t>
             </a:fld>
             <a:endParaRPr lang="en-US" dirty="0"/>
           </a:p>
@@ -5795,7 +5995,7 @@
           <a:p>
             <a:fld id="{48A87A34-81AB-432B-8DAE-1953F412C126}" type="datetimeFigureOut">
               <a:rPr lang="en-US" dirty="0"/>
-              <a:t>12/6/2024</a:t>
+              <a:t>12/7/2024</a:t>
             </a:fld>
             <a:endParaRPr lang="en-US" dirty="0"/>
           </a:p>
@@ -6169,7 +6369,7 @@
           <a:p>
             <a:fld id="{48A87A34-81AB-432B-8DAE-1953F412C126}" type="datetimeFigureOut">
               <a:rPr lang="en-US" dirty="0"/>
-              <a:t>12/6/2024</a:t>
+              <a:t>12/7/2024</a:t>
             </a:fld>
             <a:endParaRPr lang="en-US" dirty="0"/>
           </a:p>
@@ -6282,7 +6482,7 @@
           <a:p>
             <a:fld id="{48A87A34-81AB-432B-8DAE-1953F412C126}" type="datetimeFigureOut">
               <a:rPr lang="en-US" dirty="0"/>
-              <a:t>12/6/2024</a:t>
+              <a:t>12/7/2024</a:t>
             </a:fld>
             <a:endParaRPr lang="en-US" dirty="0"/>
           </a:p>
@@ -6372,7 +6572,7 @@
           <a:p>
             <a:fld id="{48A87A34-81AB-432B-8DAE-1953F412C126}" type="datetimeFigureOut">
               <a:rPr lang="en-US" dirty="0"/>
-              <a:t>12/6/2024</a:t>
+              <a:t>12/7/2024</a:t>
             </a:fld>
             <a:endParaRPr lang="en-US" dirty="0"/>
           </a:p>
@@ -6616,7 +6816,7 @@
           <a:p>
             <a:fld id="{48A87A34-81AB-432B-8DAE-1953F412C126}" type="datetimeFigureOut">
               <a:rPr lang="en-US" dirty="0"/>
-              <a:t>12/6/2024</a:t>
+              <a:t>12/7/2024</a:t>
             </a:fld>
             <a:endParaRPr lang="en-US" dirty="0"/>
           </a:p>
@@ -6868,7 +7068,7 @@
           <a:p>
             <a:fld id="{48A87A34-81AB-432B-8DAE-1953F412C126}" type="datetimeFigureOut">
               <a:rPr lang="en-US" dirty="0"/>
-              <a:t>12/6/2024</a:t>
+              <a:t>12/7/2024</a:t>
             </a:fld>
             <a:endParaRPr lang="en-US" dirty="0"/>
           </a:p>
@@ -7107,7 +7307,7 @@
             <a:fld id="{48A87A34-81AB-432B-8DAE-1953F412C126}" type="datetimeFigureOut">
               <a:rPr lang="en-US" dirty="0"/>
               <a:pPr/>
-              <a:t>12/6/2024</a:t>
+              <a:t>12/7/2024</a:t>
             </a:fld>
             <a:endParaRPr lang="en-US" dirty="0"/>
           </a:p>
@@ -8085,7 +8285,7 @@
           </p:nvPr>
         </p:nvPicPr>
         <p:blipFill>
-          <a:blip r:embed="rId4"/>
+          <a:blip r:embed="rId3"/>
           <a:stretch>
             <a:fillRect/>
           </a:stretch>
@@ -8112,7 +8312,7 @@
           <p:nvPr/>
         </p:nvPicPr>
         <p:blipFill>
-          <a:blip r:embed="rId5"/>
+          <a:blip r:embed="rId4"/>
           <a:stretch>
             <a:fillRect/>
           </a:stretch>
@@ -8137,11 +8337,6 @@
   <p:clrMapOvr>
     <a:masterClrMapping/>
   </p:clrMapOvr>
-  <p:extLst>
-    <p:ext uri="{6950BFC3-D8DA-4A85-94F7-54DA5524770B}">
-      <p188:commentRel xmlns:p188="http://schemas.microsoft.com/office/powerpoint/2018/8/main" r:id="rId3"/>
-    </p:ext>
-  </p:extLst>
 </p:sld>
 </file>
 
@@ -8331,7 +8526,7 @@
           <p:nvPr/>
         </p:nvPicPr>
         <p:blipFill>
-          <a:blip r:embed="rId4"/>
+          <a:blip r:embed="rId3"/>
           <a:stretch>
             <a:fillRect/>
           </a:stretch>
@@ -8356,11 +8551,6 @@
   <p:clrMapOvr>
     <a:masterClrMapping/>
   </p:clrMapOvr>
-  <p:extLst>
-    <p:ext uri="{6950BFC3-D8DA-4A85-94F7-54DA5524770B}">
-      <p188:commentRel xmlns:p188="http://schemas.microsoft.com/office/powerpoint/2018/8/main" r:id="rId3"/>
-    </p:ext>
-  </p:extLst>
 </p:sld>
 </file>
 
@@ -9377,23 +9567,6 @@
 </file>
 
 <file path=customXml/item1.xml><?xml version="1.0" encoding="utf-8"?>
-<p:properties xmlns:p="http://schemas.microsoft.com/office/2006/metadata/properties" xmlns:xsi="http://www.w3.org/2001/XMLSchema-instance" xmlns:pc="http://schemas.microsoft.com/office/infopath/2007/PartnerControls">
-  <documentManagement>
-    <_activity xmlns="2ab49c7d-e0cb-456a-a982-c1372bb41def" xsi:nil="true"/>
-  </documentManagement>
-</p:properties>
-</file>
-
-<file path=customXml/item2.xml><?xml version="1.0" encoding="utf-8"?>
-<?mso-contentType ?>
-<FormTemplates xmlns="http://schemas.microsoft.com/sharepoint/v3/contenttype/forms">
-  <Display>DocumentLibraryForm</Display>
-  <Edit>DocumentLibraryForm</Edit>
-  <New>DocumentLibraryForm</New>
-</FormTemplates>
-</file>
-
-<file path=customXml/item3.xml><?xml version="1.0" encoding="utf-8"?>
 <ct:contentTypeSchema xmlns:ct="http://schemas.microsoft.com/office/2006/metadata/contentType" xmlns:ma="http://schemas.microsoft.com/office/2006/metadata/properties/metaAttributes" ct:_="" ma:_="" ma:contentTypeName="Dokument" ma:contentTypeID="0x010100047D4BD4CA813A4FA0F052C1F2323C18" ma:contentTypeVersion="2" ma:contentTypeDescription="Ein neues Dokument erstellen." ma:contentTypeScope="" ma:versionID="07dd6e411d376bff88bdc6ade6301a5b">
   <xsd:schema xmlns:xsd="http://www.w3.org/2001/XMLSchema" xmlns:xs="http://www.w3.org/2001/XMLSchema" xmlns:p="http://schemas.microsoft.com/office/2006/metadata/properties" xmlns:ns3="2ab49c7d-e0cb-456a-a982-c1372bb41def" targetNamespace="http://schemas.microsoft.com/office/2006/metadata/properties" ma:root="true" ma:fieldsID="8d5c05b689578936cd6e01a0974eca31" ns3:_="">
     <xsd:import namespace="2ab49c7d-e0cb-456a-a982-c1372bb41def"/>
@@ -9525,31 +9698,24 @@
 </ct:contentTypeSchema>
 </file>
 
-<file path=customXml/itemProps1.xml><?xml version="1.0" encoding="utf-8"?>
-<ds:datastoreItem xmlns:ds="http://schemas.openxmlformats.org/officeDocument/2006/customXml" ds:itemID="{55DFB402-50F2-4745-BEDB-4CE754649B21}">
-  <ds:schemaRefs>
-    <ds:schemaRef ds:uri="http://schemas.microsoft.com/office/2006/documentManagement/types"/>
-    <ds:schemaRef ds:uri="http://schemas.microsoft.com/office/2006/metadata/properties"/>
-    <ds:schemaRef ds:uri="http://www.w3.org/XML/1998/namespace"/>
-    <ds:schemaRef ds:uri="http://purl.org/dc/elements/1.1/"/>
-    <ds:schemaRef ds:uri="http://schemas.microsoft.com/office/infopath/2007/PartnerControls"/>
-    <ds:schemaRef ds:uri="http://purl.org/dc/terms/"/>
-    <ds:schemaRef ds:uri="2ab49c7d-e0cb-456a-a982-c1372bb41def"/>
-    <ds:schemaRef ds:uri="http://purl.org/dc/dcmitype/"/>
-    <ds:schemaRef ds:uri="http://schemas.openxmlformats.org/package/2006/metadata/core-properties"/>
-  </ds:schemaRefs>
-</ds:datastoreItem>
+<file path=customXml/item2.xml><?xml version="1.0" encoding="utf-8"?>
+<?mso-contentType ?>
+<FormTemplates xmlns="http://schemas.microsoft.com/sharepoint/v3/contenttype/forms">
+  <Display>DocumentLibraryForm</Display>
+  <Edit>DocumentLibraryForm</Edit>
+  <New>DocumentLibraryForm</New>
+</FormTemplates>
 </file>
 
-<file path=customXml/itemProps2.xml><?xml version="1.0" encoding="utf-8"?>
-<ds:datastoreItem xmlns:ds="http://schemas.openxmlformats.org/officeDocument/2006/customXml" ds:itemID="{244B7BE8-9095-4F86-A9FD-EF61FD86C91D}">
-  <ds:schemaRefs>
-    <ds:schemaRef ds:uri="http://schemas.microsoft.com/sharepoint/v3/contenttype/forms"/>
-  </ds:schemaRefs>
-</ds:datastoreItem>
+<file path=customXml/item3.xml><?xml version="1.0" encoding="utf-8"?>
+<p:properties xmlns:p="http://schemas.microsoft.com/office/2006/metadata/properties" xmlns:xsi="http://www.w3.org/2001/XMLSchema-instance" xmlns:pc="http://schemas.microsoft.com/office/infopath/2007/PartnerControls">
+  <documentManagement>
+    <_activity xmlns="2ab49c7d-e0cb-456a-a982-c1372bb41def" xsi:nil="true"/>
+  </documentManagement>
+</p:properties>
 </file>
 
-<file path=customXml/itemProps3.xml><?xml version="1.0" encoding="utf-8"?>
+<file path=customXml/itemProps1.xml><?xml version="1.0" encoding="utf-8"?>
 <ds:datastoreItem xmlns:ds="http://schemas.openxmlformats.org/officeDocument/2006/customXml" ds:itemID="{E04A02D7-A250-4784-A2D5-FE632CEFA86C}">
   <ds:schemaRefs>
     <ds:schemaRef ds:uri="http://schemas.microsoft.com/office/2006/metadata/contentType"/>
@@ -9565,4 +9731,28 @@
     <ds:schemaRef ds:uri="http://schemas.microsoft.com/internal/obd"/>
   </ds:schemaRefs>
 </ds:datastoreItem>
+</file>
+
+<file path=customXml/itemProps2.xml><?xml version="1.0" encoding="utf-8"?>
+<ds:datastoreItem xmlns:ds="http://schemas.openxmlformats.org/officeDocument/2006/customXml" ds:itemID="{244B7BE8-9095-4F86-A9FD-EF61FD86C91D}">
+  <ds:schemaRefs>
+    <ds:schemaRef ds:uri="http://schemas.microsoft.com/sharepoint/v3/contenttype/forms"/>
+  </ds:schemaRefs>
+</ds:datastoreItem>
+</file>
+
+<file path=customXml/itemProps3.xml><?xml version="1.0" encoding="utf-8"?>
+<ds:datastoreItem xmlns:ds="http://schemas.openxmlformats.org/officeDocument/2006/customXml" ds:itemID="{55DFB402-50F2-4745-BEDB-4CE754649B21}">
+  <ds:schemaRefs>
+    <ds:schemaRef ds:uri="http://schemas.microsoft.com/office/2006/documentManagement/types"/>
+    <ds:schemaRef ds:uri="http://schemas.microsoft.com/office/2006/metadata/properties"/>
+    <ds:schemaRef ds:uri="http://www.w3.org/XML/1998/namespace"/>
+    <ds:schemaRef ds:uri="http://purl.org/dc/elements/1.1/"/>
+    <ds:schemaRef ds:uri="http://schemas.microsoft.com/office/infopath/2007/PartnerControls"/>
+    <ds:schemaRef ds:uri="http://purl.org/dc/terms/"/>
+    <ds:schemaRef ds:uri="2ab49c7d-e0cb-456a-a982-c1372bb41def"/>
+    <ds:schemaRef ds:uri="http://purl.org/dc/dcmitype/"/>
+    <ds:schemaRef ds:uri="http://schemas.openxmlformats.org/package/2006/metadata/core-properties"/>
+  </ds:schemaRefs>
+</ds:datastoreItem>
 </file>
</xml_diff>